<commit_message>
add mentor name to presentation 1
</commit_message>
<xml_diff>
--- a/presentations/Presentation 1.pptx
+++ b/presentations/Presentation 1.pptx
@@ -108,6 +108,11 @@
       </a:defRPr>
     </a:lvl9pPr>
   </p:defaultTextStyle>
+  <p:extLst>
+    <p:ext uri="{EFAFB233-063F-42B5-8137-9DF3F51BA10A}">
+      <p15:sldGuideLst xmlns:p15="http://schemas.microsoft.com/office/powerpoint/2012/main"/>
+    </p:ext>
+  </p:extLst>
 </p:presentation>
 </file>
 
@@ -206,7 +211,7 @@
           <a:effectLst/>
           <a:extLst>
             <a:ext uri="{91240B29-F687-4f45-9708-019B960494DF}">
-              <a14:hiddenLine xmlns:a14="http://schemas.microsoft.com/office/drawing/2010/main" xmlns="" w="9525">
+              <a14:hiddenLine xmlns="" xmlns:a14="http://schemas.microsoft.com/office/drawing/2010/main" w="9525">
                 <a:solidFill>
                   <a:srgbClr val="000000"/>
                 </a:solidFill>
@@ -1736,7 +1741,7 @@
           <a:ln/>
           <a:extLst>
             <a:ext uri="{91240B29-F687-4f45-9708-019B960494DF}">
-              <a14:hiddenLine xmlns:a14="http://schemas.microsoft.com/office/drawing/2010/main" xmlns="" w="9525">
+              <a14:hiddenLine xmlns="" xmlns:a14="http://schemas.microsoft.com/office/drawing/2010/main" w="9525">
                 <a:solidFill>
                   <a:srgbClr val="000000"/>
                 </a:solidFill>
@@ -2011,7 +2016,7 @@
           <a:ln/>
           <a:extLst>
             <a:ext uri="{91240B29-F687-4f45-9708-019B960494DF}">
-              <a14:hiddenLine xmlns:a14="http://schemas.microsoft.com/office/drawing/2010/main" xmlns="" w="9525">
+              <a14:hiddenLine xmlns="" xmlns:a14="http://schemas.microsoft.com/office/drawing/2010/main" w="9525">
                 <a:solidFill>
                   <a:srgbClr val="000000"/>
                 </a:solidFill>
@@ -2296,7 +2301,7 @@
           <a:ln/>
           <a:extLst>
             <a:ext uri="{91240B29-F687-4f45-9708-019B960494DF}">
-              <a14:hiddenLine xmlns:a14="http://schemas.microsoft.com/office/drawing/2010/main" xmlns="" w="9525">
+              <a14:hiddenLine xmlns="" xmlns:a14="http://schemas.microsoft.com/office/drawing/2010/main" w="9525">
                 <a:solidFill>
                   <a:srgbClr val="000000"/>
                 </a:solidFill>
@@ -2924,7 +2929,7 @@
           <a:ln/>
           <a:extLst>
             <a:ext uri="{91240B29-F687-4f45-9708-019B960494DF}">
-              <a14:hiddenLine xmlns:a14="http://schemas.microsoft.com/office/drawing/2010/main" xmlns="" w="9525">
+              <a14:hiddenLine xmlns="" xmlns:a14="http://schemas.microsoft.com/office/drawing/2010/main" w="9525">
                 <a:solidFill>
                   <a:srgbClr val="000000"/>
                 </a:solidFill>
@@ -3263,7 +3268,7 @@
           <a:ln/>
           <a:extLst>
             <a:ext uri="{91240B29-F687-4f45-9708-019B960494DF}">
-              <a14:hiddenLine xmlns:a14="http://schemas.microsoft.com/office/drawing/2010/main" xmlns="" w="9525">
+              <a14:hiddenLine xmlns="" xmlns:a14="http://schemas.microsoft.com/office/drawing/2010/main" w="9525">
                 <a:solidFill>
                   <a:srgbClr val="000000"/>
                 </a:solidFill>
@@ -3742,7 +3747,7 @@
           <a:ln/>
           <a:extLst>
             <a:ext uri="{91240B29-F687-4f45-9708-019B960494DF}">
-              <a14:hiddenLine xmlns:a14="http://schemas.microsoft.com/office/drawing/2010/main" xmlns="" w="9525">
+              <a14:hiddenLine xmlns="" xmlns:a14="http://schemas.microsoft.com/office/drawing/2010/main" w="9525">
                 <a:solidFill>
                   <a:srgbClr val="000000"/>
                 </a:solidFill>
@@ -4175,7 +4180,7 @@
           <a:ln/>
           <a:extLst>
             <a:ext uri="{91240B29-F687-4f45-9708-019B960494DF}">
-              <a14:hiddenLine xmlns:a14="http://schemas.microsoft.com/office/drawing/2010/main" xmlns="" w="9525">
+              <a14:hiddenLine xmlns="" xmlns:a14="http://schemas.microsoft.com/office/drawing/2010/main" w="9525">
                 <a:solidFill>
                   <a:srgbClr val="000000"/>
                 </a:solidFill>
@@ -5437,7 +5442,7 @@
             <a:pPr algn="ctr"/>
             <a:r>
               <a:rPr lang="en-US" sz="3200" dirty="0"/>
-              <a:t>Cost-Sensitive Boosting</a:t>
+              <a:t>Project 12: Cost-Sensitive Boosting</a:t>
             </a:r>
             <a:br>
               <a:rPr lang="en-US" sz="3200" dirty="0"/>
@@ -5474,21 +5479,26 @@
           <a:lstStyle/>
           <a:p>
             <a:r>
+              <a:rPr lang="de-DE" sz="1600" dirty="0">
+                <a:solidFill>
+                  <a:schemeClr val="bg1"/>
+                </a:solidFill>
+              </a:rPr>
+              <a:t>Mentor: Prof. Dr. Eirini </a:t>
+            </a:r>
+            <a:r>
               <a:rPr lang="de-DE" sz="1600" dirty="0" err="1">
                 <a:solidFill>
                   <a:schemeClr val="bg1"/>
                 </a:solidFill>
               </a:rPr>
-              <a:t>Presentation</a:t>
-            </a:r>
-            <a:r>
-              <a:rPr lang="de-DE" sz="1600" dirty="0">
-                <a:solidFill>
-                  <a:schemeClr val="bg1"/>
-                </a:solidFill>
-              </a:rPr>
-              <a:t> on 29.11.2019</a:t>
-            </a:r>
+              <a:t>Ntoutsi</a:t>
+            </a:r>
+            <a:endParaRPr lang="de-DE" sz="1600" dirty="0">
+              <a:solidFill>
+                <a:schemeClr val="bg1"/>
+              </a:solidFill>
+            </a:endParaRPr>
           </a:p>
           <a:p>
             <a:r>

</xml_diff>